<commit_message>
"update to the ppt done"
</commit_message>
<xml_diff>
--- a/audit_presentation/TEAM_GROVER_AUDIT_WK1.pptx
+++ b/audit_presentation/TEAM_GROVER_AUDIT_WK1.pptx
@@ -7021,7 +7021,7 @@
             </a:pPr>
             <a:r>
               <a:rPr lang="en-US" dirty="0"/>
-              <a:t>Touch screen setup on raspberry pi.</a:t>
+              <a:t>Touch screen setup on raspberry pi and ROS installation done.</a:t>
             </a:r>
           </a:p>
           <a:p>
@@ -8593,15 +8593,6 @@
 </file>
 
 <file path=customXml/item1.xml><?xml version="1.0" encoding="utf-8"?>
-<?mso-contentType ?>
-<FormTemplates xmlns="http://schemas.microsoft.com/sharepoint/v3/contenttype/forms">
-  <Display>DocumentLibraryForm</Display>
-  <Edit>DocumentLibraryForm</Edit>
-  <New>DocumentLibraryForm</New>
-</FormTemplates>
-</file>
-
-<file path=customXml/item2.xml><?xml version="1.0" encoding="utf-8"?>
 <p:properties xmlns:p="http://schemas.microsoft.com/office/2006/metadata/properties" xmlns:xsi="http://www.w3.org/2001/XMLSchema-instance" xmlns:pc="http://schemas.microsoft.com/office/infopath/2007/PartnerControls">
   <documentManagement>
     <_ip_UnifiedCompliancePolicyUIAction xmlns="http://schemas.microsoft.com/sharepoint/v3" xsi:nil="true"/>
@@ -8619,6 +8610,15 @@
     <MediaServiceKeyPoints xmlns="71af3243-3dd4-4a8d-8c0d-dd76da1f02a5" xsi:nil="true"/>
   </documentManagement>
 </p:properties>
+</file>
+
+<file path=customXml/item2.xml><?xml version="1.0" encoding="utf-8"?>
+<?mso-contentType ?>
+<FormTemplates xmlns="http://schemas.microsoft.com/sharepoint/v3/contenttype/forms">
+  <Display>DocumentLibraryForm</Display>
+  <Edit>DocumentLibraryForm</Edit>
+  <New>DocumentLibraryForm</New>
+</FormTemplates>
 </file>
 
 <file path=customXml/item3.xml><?xml version="1.0" encoding="utf-8"?>
@@ -8934,14 +8934,6 @@
 </file>
 
 <file path=customXml/itemProps1.xml><?xml version="1.0" encoding="utf-8"?>
-<ds:datastoreItem xmlns:ds="http://schemas.openxmlformats.org/officeDocument/2006/customXml" ds:itemID="{CABF691C-888B-4061-8A6F-D5CE84A0254B}">
-  <ds:schemaRefs>
-    <ds:schemaRef ds:uri="http://schemas.microsoft.com/sharepoint/v3/contenttype/forms"/>
-  </ds:schemaRefs>
-</ds:datastoreItem>
-</file>
-
-<file path=customXml/itemProps2.xml><?xml version="1.0" encoding="utf-8"?>
 <ds:datastoreItem xmlns:ds="http://schemas.openxmlformats.org/officeDocument/2006/customXml" ds:itemID="{49168DCE-134F-4610-A6AA-88CEBE8D71D2}">
   <ds:schemaRefs>
     <ds:schemaRef ds:uri="http://schemas.microsoft.com/office/2006/metadata/properties"/>
@@ -8949,6 +8941,14 @@
     <ds:schemaRef ds:uri="http://schemas.microsoft.com/sharepoint/v3"/>
     <ds:schemaRef ds:uri="71af3243-3dd4-4a8d-8c0d-dd76da1f02a5"/>
     <ds:schemaRef ds:uri="230e9df3-be65-4c73-a93b-d1236ebd677e"/>
+  </ds:schemaRefs>
+</ds:datastoreItem>
+</file>
+
+<file path=customXml/itemProps2.xml><?xml version="1.0" encoding="utf-8"?>
+<ds:datastoreItem xmlns:ds="http://schemas.openxmlformats.org/officeDocument/2006/customXml" ds:itemID="{CABF691C-888B-4061-8A6F-D5CE84A0254B}">
+  <ds:schemaRefs>
+    <ds:schemaRef ds:uri="http://schemas.microsoft.com/sharepoint/v3/contenttype/forms"/>
   </ds:schemaRefs>
 </ds:datastoreItem>
 </file>

</xml_diff>